<commit_message>
Update powerpoint to include picture
</commit_message>
<xml_diff>
--- a/Pitch for Virtual Piano.pptx
+++ b/Pitch for Virtual Piano.pptx
@@ -5835,6 +5835,35 @@
           <a:chExt cx="0" cy="0"/>
         </a:xfrm>
       </p:grpSpPr>
+      <p:pic>
+        <p:nvPicPr>
+          <p:cNvPr id="4" name="Picture 3"/>
+          <p:cNvPicPr>
+            <a:picLocks noChangeAspect="1"/>
+          </p:cNvPicPr>
+          <p:nvPr/>
+        </p:nvPicPr>
+        <p:blipFill rotWithShape="1">
+          <a:blip r:embed="rId2">
+            <a:extLst>
+              <a:ext uri="{28A0092B-C50C-407E-A947-70E740481C1C}">
+                <a14:useLocalDpi xmlns:a14="http://schemas.microsoft.com/office/drawing/2010/main" val="0"/>
+              </a:ext>
+            </a:extLst>
+          </a:blip>
+          <a:srcRect r="47089" b="4485"/>
+          <a:stretch/>
+        </p:blipFill>
+        <p:spPr>
+          <a:xfrm>
+            <a:off x="1576550" y="629546"/>
+            <a:ext cx="9322677" cy="5650385"/>
+          </a:xfrm>
+          <a:prstGeom prst="rect">
+            <a:avLst/>
+          </a:prstGeom>
+        </p:spPr>
+      </p:pic>
     </p:spTree>
     <p:extLst>
       <p:ext uri="{BB962C8B-B14F-4D97-AF65-F5344CB8AC3E}">

</xml_diff>

<commit_message>
Add Nish and Blaine slides
</commit_message>
<xml_diff>
--- a/Pitch for Virtual Piano.pptx
+++ b/Pitch for Virtual Piano.pptx
@@ -5810,10 +5810,50 @@
         </p:nvSpPr>
         <p:spPr/>
         <p:txBody>
-          <a:bodyPr/>
-          <a:lstStyle/>
-          <a:p>
-            <a:endParaRPr lang="en-US"/>
+          <a:bodyPr>
+            <a:normAutofit/>
+          </a:bodyPr>
+          <a:lstStyle/>
+          <a:p>
+            <a:pPr algn="r"/>
+            <a:r>
+              <a:rPr lang="en-US" sz="2400" dirty="0" smtClean="0"/>
+              <a:t>Interactive program</a:t>
+            </a:r>
+          </a:p>
+          <a:p>
+            <a:pPr algn="r"/>
+            <a:endParaRPr lang="en-US" sz="2400" dirty="0"/>
+          </a:p>
+          <a:p>
+            <a:pPr algn="r"/>
+            <a:r>
+              <a:rPr lang="en-US" sz="2400" dirty="0" smtClean="0"/>
+              <a:t>Must be entertaining</a:t>
+            </a:r>
+          </a:p>
+          <a:p>
+            <a:pPr algn="r"/>
+            <a:endParaRPr lang="en-US" sz="2400" dirty="0"/>
+          </a:p>
+          <a:p>
+            <a:pPr algn="r"/>
+            <a:r>
+              <a:rPr lang="en-US" sz="2400" dirty="0" smtClean="0"/>
+              <a:t>Simple, yet complex</a:t>
+            </a:r>
+          </a:p>
+          <a:p>
+            <a:pPr algn="r"/>
+            <a:endParaRPr lang="en-US" sz="2400" dirty="0"/>
+          </a:p>
+          <a:p>
+            <a:pPr algn="r"/>
+            <a:r>
+              <a:rPr lang="en-US" sz="2400" dirty="0" smtClean="0"/>
+              <a:t>Usable by everyone</a:t>
+            </a:r>
+            <a:endParaRPr lang="en-US" sz="2400" dirty="0"/>
           </a:p>
         </p:txBody>
       </p:sp>
@@ -6023,10 +6063,50 @@
         </p:nvSpPr>
         <p:spPr/>
         <p:txBody>
-          <a:bodyPr/>
-          <a:lstStyle/>
-          <a:p>
-            <a:endParaRPr lang="en-US"/>
+          <a:bodyPr>
+            <a:normAutofit/>
+          </a:bodyPr>
+          <a:lstStyle/>
+          <a:p>
+            <a:pPr algn="r"/>
+            <a:r>
+              <a:rPr lang="en-US" sz="2800" dirty="0" smtClean="0"/>
+              <a:t>Recording multiple lines</a:t>
+            </a:r>
+          </a:p>
+          <a:p>
+            <a:pPr algn="r"/>
+            <a:endParaRPr lang="en-US" sz="2800" dirty="0"/>
+          </a:p>
+          <a:p>
+            <a:pPr algn="r"/>
+            <a:r>
+              <a:rPr lang="en-US" sz="2800" dirty="0" smtClean="0"/>
+              <a:t>Metronome</a:t>
+            </a:r>
+          </a:p>
+          <a:p>
+            <a:pPr algn="r"/>
+            <a:endParaRPr lang="en-US" sz="2800" dirty="0"/>
+          </a:p>
+          <a:p>
+            <a:pPr algn="r"/>
+            <a:r>
+              <a:rPr lang="en-US" sz="2800" dirty="0" smtClean="0"/>
+              <a:t>Preset songs</a:t>
+            </a:r>
+          </a:p>
+          <a:p>
+            <a:pPr algn="r"/>
+            <a:endParaRPr lang="en-US" sz="2800" dirty="0"/>
+          </a:p>
+          <a:p>
+            <a:pPr algn="r"/>
+            <a:r>
+              <a:rPr lang="en-US" sz="2800" dirty="0" smtClean="0"/>
+              <a:t>Playback</a:t>
+            </a:r>
+            <a:endParaRPr lang="en-US" sz="2800" dirty="0"/>
           </a:p>
         </p:txBody>
       </p:sp>
@@ -6101,7 +6181,7 @@
           <a:bodyPr/>
           <a:lstStyle/>
           <a:p>
-            <a:endParaRPr lang="en-US"/>
+            <a:endParaRPr lang="en-US" dirty="0"/>
           </a:p>
         </p:txBody>
       </p:sp>

</xml_diff>

<commit_message>
Add in my slides, pictures, transitions
</commit_message>
<xml_diff>
--- a/Pitch for Virtual Piano.pptx
+++ b/Pitch for Virtual Piano.pptx
@@ -350,6 +350,18 @@
   <p:clrMapOvr>
     <a:masterClrMapping/>
   </p:clrMapOvr>
+  <mc:AlternateContent xmlns:mc="http://schemas.openxmlformats.org/markup-compatibility/2006">
+    <mc:Choice xmlns:p14="http://schemas.microsoft.com/office/powerpoint/2010/main" Requires="p14">
+      <p:transition spd="med" p14:dur="700">
+        <p:fade/>
+      </p:transition>
+    </mc:Choice>
+    <mc:Fallback>
+      <p:transition spd="med">
+        <p:fade/>
+      </p:transition>
+    </mc:Fallback>
+  </mc:AlternateContent>
 </p:sldLayout>
 </file>
 
@@ -602,6 +614,18 @@
   <p:clrMapOvr>
     <a:masterClrMapping/>
   </p:clrMapOvr>
+  <mc:AlternateContent xmlns:mc="http://schemas.openxmlformats.org/markup-compatibility/2006">
+    <mc:Choice xmlns:p14="http://schemas.microsoft.com/office/powerpoint/2010/main" Requires="p14">
+      <p:transition spd="med" p14:dur="700">
+        <p:fade/>
+      </p:transition>
+    </mc:Choice>
+    <mc:Fallback>
+      <p:transition spd="med">
+        <p:fade/>
+      </p:transition>
+    </mc:Fallback>
+  </mc:AlternateContent>
 </p:sldLayout>
 </file>
 
@@ -839,6 +863,18 @@
   <p:clrMapOvr>
     <a:masterClrMapping/>
   </p:clrMapOvr>
+  <mc:AlternateContent xmlns:mc="http://schemas.openxmlformats.org/markup-compatibility/2006">
+    <mc:Choice xmlns:p14="http://schemas.microsoft.com/office/powerpoint/2010/main" Requires="p14">
+      <p:transition spd="med" p14:dur="700">
+        <p:fade/>
+      </p:transition>
+    </mc:Choice>
+    <mc:Fallback>
+      <p:transition spd="med">
+        <p:fade/>
+      </p:transition>
+    </mc:Fallback>
+  </mc:AlternateContent>
 </p:sldLayout>
 </file>
 
@@ -1377,6 +1413,18 @@
   <p:clrMapOvr>
     <a:masterClrMapping/>
   </p:clrMapOvr>
+  <mc:AlternateContent xmlns:mc="http://schemas.openxmlformats.org/markup-compatibility/2006">
+    <mc:Choice xmlns:p14="http://schemas.microsoft.com/office/powerpoint/2010/main" Requires="p14">
+      <p:transition spd="med" p14:dur="700">
+        <p:fade/>
+      </p:transition>
+    </mc:Choice>
+    <mc:Fallback>
+      <p:transition spd="med">
+        <p:fade/>
+      </p:transition>
+    </mc:Fallback>
+  </mc:AlternateContent>
 </p:sldLayout>
 </file>
 
@@ -1614,6 +1662,18 @@
   <p:clrMapOvr>
     <a:masterClrMapping/>
   </p:clrMapOvr>
+  <mc:AlternateContent xmlns:mc="http://schemas.openxmlformats.org/markup-compatibility/2006">
+    <mc:Choice xmlns:p14="http://schemas.microsoft.com/office/powerpoint/2010/main" Requires="p14">
+      <p:transition spd="med" p14:dur="700">
+        <p:fade/>
+      </p:transition>
+    </mc:Choice>
+    <mc:Fallback>
+      <p:transition spd="med">
+        <p:fade/>
+      </p:transition>
+    </mc:Fallback>
+  </mc:AlternateContent>
 </p:sldLayout>
 </file>
 
@@ -2146,6 +2206,18 @@
   <p:clrMapOvr>
     <a:masterClrMapping/>
   </p:clrMapOvr>
+  <mc:AlternateContent xmlns:mc="http://schemas.openxmlformats.org/markup-compatibility/2006">
+    <mc:Choice xmlns:p14="http://schemas.microsoft.com/office/powerpoint/2010/main" Requires="p14">
+      <p:transition spd="med" p14:dur="700">
+        <p:fade/>
+      </p:transition>
+    </mc:Choice>
+    <mc:Fallback>
+      <p:transition spd="med">
+        <p:fade/>
+      </p:transition>
+    </mc:Fallback>
+  </mc:AlternateContent>
 </p:sldLayout>
 </file>
 
@@ -2915,6 +2987,18 @@
   <p:clrMapOvr>
     <a:masterClrMapping/>
   </p:clrMapOvr>
+  <mc:AlternateContent xmlns:mc="http://schemas.openxmlformats.org/markup-compatibility/2006">
+    <mc:Choice xmlns:p14="http://schemas.microsoft.com/office/powerpoint/2010/main" Requires="p14">
+      <p:transition spd="med" p14:dur="700">
+        <p:fade/>
+      </p:transition>
+    </mc:Choice>
+    <mc:Fallback>
+      <p:transition spd="med">
+        <p:fade/>
+      </p:transition>
+    </mc:Fallback>
+  </mc:AlternateContent>
 </p:sldLayout>
 </file>
 
@@ -3085,6 +3169,18 @@
   <p:clrMapOvr>
     <a:masterClrMapping/>
   </p:clrMapOvr>
+  <mc:AlternateContent xmlns:mc="http://schemas.openxmlformats.org/markup-compatibility/2006">
+    <mc:Choice xmlns:p14="http://schemas.microsoft.com/office/powerpoint/2010/main" Requires="p14">
+      <p:transition spd="med" p14:dur="700">
+        <p:fade/>
+      </p:transition>
+    </mc:Choice>
+    <mc:Fallback>
+      <p:transition spd="med">
+        <p:fade/>
+      </p:transition>
+    </mc:Fallback>
+  </mc:AlternateContent>
 </p:sldLayout>
 </file>
 
@@ -3314,6 +3410,18 @@
   <p:clrMapOvr>
     <a:masterClrMapping/>
   </p:clrMapOvr>
+  <mc:AlternateContent xmlns:mc="http://schemas.openxmlformats.org/markup-compatibility/2006">
+    <mc:Choice xmlns:p14="http://schemas.microsoft.com/office/powerpoint/2010/main" Requires="p14">
+      <p:transition spd="med" p14:dur="700">
+        <p:fade/>
+      </p:transition>
+    </mc:Choice>
+    <mc:Fallback>
+      <p:transition spd="med">
+        <p:fade/>
+      </p:transition>
+    </mc:Fallback>
+  </mc:AlternateContent>
 </p:sldLayout>
 </file>
 
@@ -3479,6 +3587,18 @@
   <p:clrMapOvr>
     <a:masterClrMapping/>
   </p:clrMapOvr>
+  <mc:AlternateContent xmlns:mc="http://schemas.openxmlformats.org/markup-compatibility/2006">
+    <mc:Choice xmlns:p14="http://schemas.microsoft.com/office/powerpoint/2010/main" Requires="p14">
+      <p:transition spd="med" p14:dur="700">
+        <p:fade/>
+      </p:transition>
+    </mc:Choice>
+    <mc:Fallback>
+      <p:transition spd="med">
+        <p:fade/>
+      </p:transition>
+    </mc:Fallback>
+  </mc:AlternateContent>
 </p:sldLayout>
 </file>
 
@@ -3774,6 +3894,18 @@
   <p:clrMapOvr>
     <a:masterClrMapping/>
   </p:clrMapOvr>
+  <mc:AlternateContent xmlns:mc="http://schemas.openxmlformats.org/markup-compatibility/2006">
+    <mc:Choice xmlns:p14="http://schemas.microsoft.com/office/powerpoint/2010/main" Requires="p14">
+      <p:transition spd="med" p14:dur="700">
+        <p:fade/>
+      </p:transition>
+    </mc:Choice>
+    <mc:Fallback>
+      <p:transition spd="med">
+        <p:fade/>
+      </p:transition>
+    </mc:Fallback>
+  </mc:AlternateContent>
 </p:sldLayout>
 </file>
 
@@ -4001,6 +4133,18 @@
   <p:clrMapOvr>
     <a:masterClrMapping/>
   </p:clrMapOvr>
+  <mc:AlternateContent xmlns:mc="http://schemas.openxmlformats.org/markup-compatibility/2006">
+    <mc:Choice xmlns:p14="http://schemas.microsoft.com/office/powerpoint/2010/main" Requires="p14">
+      <p:transition spd="med" p14:dur="700">
+        <p:fade/>
+      </p:transition>
+    </mc:Choice>
+    <mc:Fallback>
+      <p:transition spd="med">
+        <p:fade/>
+      </p:transition>
+    </mc:Fallback>
+  </mc:AlternateContent>
 </p:sldLayout>
 </file>
 
@@ -4375,6 +4519,18 @@
   <p:clrMapOvr>
     <a:masterClrMapping/>
   </p:clrMapOvr>
+  <mc:AlternateContent xmlns:mc="http://schemas.openxmlformats.org/markup-compatibility/2006">
+    <mc:Choice xmlns:p14="http://schemas.microsoft.com/office/powerpoint/2010/main" Requires="p14">
+      <p:transition spd="med" p14:dur="700">
+        <p:fade/>
+      </p:transition>
+    </mc:Choice>
+    <mc:Fallback>
+      <p:transition spd="med">
+        <p:fade/>
+      </p:transition>
+    </mc:Fallback>
+  </mc:AlternateContent>
 </p:sldLayout>
 </file>
 
@@ -4488,6 +4644,18 @@
   <p:clrMapOvr>
     <a:masterClrMapping/>
   </p:clrMapOvr>
+  <mc:AlternateContent xmlns:mc="http://schemas.openxmlformats.org/markup-compatibility/2006">
+    <mc:Choice xmlns:p14="http://schemas.microsoft.com/office/powerpoint/2010/main" Requires="p14">
+      <p:transition spd="med" p14:dur="700">
+        <p:fade/>
+      </p:transition>
+    </mc:Choice>
+    <mc:Fallback>
+      <p:transition spd="med">
+        <p:fade/>
+      </p:transition>
+    </mc:Fallback>
+  </mc:AlternateContent>
 </p:sldLayout>
 </file>
 
@@ -4578,6 +4746,18 @@
   <p:clrMapOvr>
     <a:masterClrMapping/>
   </p:clrMapOvr>
+  <mc:AlternateContent xmlns:mc="http://schemas.openxmlformats.org/markup-compatibility/2006">
+    <mc:Choice xmlns:p14="http://schemas.microsoft.com/office/powerpoint/2010/main" Requires="p14">
+      <p:transition spd="med" p14:dur="700">
+        <p:fade/>
+      </p:transition>
+    </mc:Choice>
+    <mc:Fallback>
+      <p:transition spd="med">
+        <p:fade/>
+      </p:transition>
+    </mc:Fallback>
+  </mc:AlternateContent>
 </p:sldLayout>
 </file>
 
@@ -4822,6 +5002,18 @@
   <p:clrMapOvr>
     <a:masterClrMapping/>
   </p:clrMapOvr>
+  <mc:AlternateContent xmlns:mc="http://schemas.openxmlformats.org/markup-compatibility/2006">
+    <mc:Choice xmlns:p14="http://schemas.microsoft.com/office/powerpoint/2010/main" Requires="p14">
+      <p:transition spd="med" p14:dur="700">
+        <p:fade/>
+      </p:transition>
+    </mc:Choice>
+    <mc:Fallback>
+      <p:transition spd="med">
+        <p:fade/>
+      </p:transition>
+    </mc:Fallback>
+  </mc:AlternateContent>
 </p:sldLayout>
 </file>
 
@@ -5074,6 +5266,18 @@
   <p:clrMapOvr>
     <a:masterClrMapping/>
   </p:clrMapOvr>
+  <mc:AlternateContent xmlns:mc="http://schemas.openxmlformats.org/markup-compatibility/2006">
+    <mc:Choice xmlns:p14="http://schemas.microsoft.com/office/powerpoint/2010/main" Requires="p14">
+      <p:transition spd="med" p14:dur="700">
+        <p:fade/>
+      </p:transition>
+    </mc:Choice>
+    <mc:Fallback>
+      <p:transition spd="med">
+        <p:fade/>
+      </p:transition>
+    </mc:Fallback>
+  </mc:AlternateContent>
 </p:sldLayout>
 </file>
 
@@ -5367,6 +5571,18 @@
     <p:sldLayoutId id="2147483658" r:id="rId16"/>
     <p:sldLayoutId id="2147483659" r:id="rId17"/>
   </p:sldLayoutIdLst>
+  <mc:AlternateContent xmlns:mc="http://schemas.openxmlformats.org/markup-compatibility/2006">
+    <mc:Choice xmlns:p14="http://schemas.microsoft.com/office/powerpoint/2010/main" Requires="p14">
+      <p:transition spd="med" p14:dur="700">
+        <p:fade/>
+      </p:transition>
+    </mc:Choice>
+    <mc:Fallback>
+      <p:transition spd="med">
+        <p:fade/>
+      </p:transition>
+    </mc:Fallback>
+  </mc:AlternateContent>
   <p:txStyles>
     <p:titleStyle>
       <a:lvl1pPr algn="r" defTabSz="914400" rtl="0" eaLnBrk="1" latinLnBrk="0" hangingPunct="1">
@@ -5726,13 +5942,26 @@
           </a:xfrm>
         </p:spPr>
         <p:txBody>
-          <a:bodyPr/>
+          <a:bodyPr>
+            <a:normAutofit fontScale="92500" lnSpcReduction="10000"/>
+          </a:bodyPr>
           <a:lstStyle/>
           <a:p>
             <a:pPr algn="ctr"/>
             <a:r>
               <a:rPr lang="en-US" dirty="0" smtClean="0"/>
-              <a:t>Nish Dara, Thomas Franklin, Devon Grove, Blaine Weeks</a:t>
+              <a:t>Nish Dara, Thomas Franklin, Devon Grove, Blaine </a:t>
+            </a:r>
+            <a:r>
+              <a:rPr lang="en-US" dirty="0" smtClean="0"/>
+              <a:t>Weeks</a:t>
+            </a:r>
+          </a:p>
+          <a:p>
+            <a:pPr algn="ctr"/>
+            <a:r>
+              <a:rPr lang="en-US" dirty="0" smtClean="0"/>
+              <a:t>“Do it for the Rackets”</a:t>
             </a:r>
             <a:endParaRPr lang="en-US" dirty="0"/>
           </a:p>
@@ -5748,6 +5977,18 @@
   <p:clrMapOvr>
     <a:masterClrMapping/>
   </p:clrMapOvr>
+  <mc:AlternateContent xmlns:mc="http://schemas.openxmlformats.org/markup-compatibility/2006">
+    <mc:Choice xmlns:p14="http://schemas.microsoft.com/office/powerpoint/2010/main" Requires="p14">
+      <p:transition spd="med" p14:dur="700">
+        <p:fade/>
+      </p:transition>
+    </mc:Choice>
+    <mc:Fallback>
+      <p:transition spd="med">
+        <p:fade/>
+      </p:transition>
+    </mc:Fallback>
+  </mc:AlternateContent>
   <p:timing>
     <p:tnLst>
       <p:par>
@@ -5857,6 +6098,47 @@
           </a:p>
         </p:txBody>
       </p:sp>
+      <p:pic>
+        <p:nvPicPr>
+          <p:cNvPr id="1026" name="Picture 2" descr="http://www.macupdate.com/images/icons256/39187.png"/>
+          <p:cNvPicPr>
+            <a:picLocks noChangeAspect="1" noChangeArrowheads="1"/>
+          </p:cNvPicPr>
+          <p:nvPr/>
+        </p:nvPicPr>
+        <p:blipFill>
+          <a:blip r:embed="rId2">
+            <a:extLst>
+              <a:ext uri="{28A0092B-C50C-407E-A947-70E740481C1C}">
+                <a14:useLocalDpi xmlns:a14="http://schemas.microsoft.com/office/drawing/2010/main" val="0"/>
+              </a:ext>
+            </a:extLst>
+          </a:blip>
+          <a:srcRect/>
+          <a:stretch>
+            <a:fillRect/>
+          </a:stretch>
+        </p:blipFill>
+        <p:spPr bwMode="auto">
+          <a:xfrm>
+            <a:off x="1376692" y="1684215"/>
+            <a:ext cx="3987800" cy="3987800"/>
+          </a:xfrm>
+          <a:prstGeom prst="rect">
+            <a:avLst/>
+          </a:prstGeom>
+          <a:noFill/>
+          <a:extLst>
+            <a:ext uri="{909E8E84-426E-40DD-AFC4-6F175D3DCCD1}">
+              <a14:hiddenFill xmlns:a14="http://schemas.microsoft.com/office/drawing/2010/main">
+                <a:solidFill>
+                  <a:srgbClr val="FFFFFF"/>
+                </a:solidFill>
+              </a14:hiddenFill>
+            </a:ext>
+          </a:extLst>
+        </p:spPr>
+      </p:pic>
     </p:spTree>
     <p:extLst>
       <p:ext uri="{BB962C8B-B14F-4D97-AF65-F5344CB8AC3E}">
@@ -5867,10 +6149,101 @@
   <p:clrMapOvr>
     <a:masterClrMapping/>
   </p:clrMapOvr>
+  <mc:AlternateContent xmlns:mc="http://schemas.openxmlformats.org/markup-compatibility/2006">
+    <mc:Choice xmlns:p14="http://schemas.microsoft.com/office/powerpoint/2010/main" Requires="p14">
+      <p:transition spd="med" p14:dur="700">
+        <p:fade/>
+      </p:transition>
+    </mc:Choice>
+    <mc:Fallback>
+      <p:transition spd="med">
+        <p:fade/>
+      </p:transition>
+    </mc:Fallback>
+  </mc:AlternateContent>
   <p:timing>
     <p:tnLst>
       <p:par>
-        <p:cTn id="1" dur="indefinite" restart="never" nodeType="tmRoot"/>
+        <p:cTn id="1" dur="indefinite" restart="never" nodeType="tmRoot">
+          <p:childTnLst>
+            <p:seq concurrent="1" nextAc="seek">
+              <p:cTn id="2" dur="indefinite" nodeType="mainSeq">
+                <p:childTnLst>
+                  <p:par>
+                    <p:cTn id="3" fill="hold">
+                      <p:stCondLst>
+                        <p:cond delay="indefinite"/>
+                        <p:cond evt="onBegin" delay="0">
+                          <p:tn val="2"/>
+                        </p:cond>
+                      </p:stCondLst>
+                      <p:childTnLst>
+                        <p:par>
+                          <p:cTn id="4" fill="hold">
+                            <p:stCondLst>
+                              <p:cond delay="0"/>
+                            </p:stCondLst>
+                            <p:childTnLst>
+                              <p:par>
+                                <p:cTn id="5" presetID="10" presetClass="entr" presetSubtype="0" fill="hold" nodeType="withEffect">
+                                  <p:stCondLst>
+                                    <p:cond delay="500"/>
+                                  </p:stCondLst>
+                                  <p:childTnLst>
+                                    <p:set>
+                                      <p:cBhvr>
+                                        <p:cTn id="6" dur="1" fill="hold">
+                                          <p:stCondLst>
+                                            <p:cond delay="0"/>
+                                          </p:stCondLst>
+                                        </p:cTn>
+                                        <p:tgtEl>
+                                          <p:spTgt spid="1026"/>
+                                        </p:tgtEl>
+                                        <p:attrNameLst>
+                                          <p:attrName>style.visibility</p:attrName>
+                                        </p:attrNameLst>
+                                      </p:cBhvr>
+                                      <p:to>
+                                        <p:strVal val="visible"/>
+                                      </p:to>
+                                    </p:set>
+                                    <p:animEffect transition="in" filter="fade">
+                                      <p:cBhvr>
+                                        <p:cTn id="7" dur="1000"/>
+                                        <p:tgtEl>
+                                          <p:spTgt spid="1026"/>
+                                        </p:tgtEl>
+                                      </p:cBhvr>
+                                    </p:animEffect>
+                                  </p:childTnLst>
+                                </p:cTn>
+                              </p:par>
+                            </p:childTnLst>
+                          </p:cTn>
+                        </p:par>
+                      </p:childTnLst>
+                    </p:cTn>
+                  </p:par>
+                </p:childTnLst>
+              </p:cTn>
+              <p:prevCondLst>
+                <p:cond evt="onPrev" delay="0">
+                  <p:tgtEl>
+                    <p:sldTgt/>
+                  </p:tgtEl>
+                </p:cond>
+              </p:prevCondLst>
+              <p:nextCondLst>
+                <p:cond evt="onNext" delay="0">
+                  <p:tgtEl>
+                    <p:sldTgt/>
+                  </p:tgtEl>
+                </p:cond>
+              </p:nextCondLst>
+            </p:seq>
+          </p:childTnLst>
+        </p:cTn>
       </p:par>
     </p:tnLst>
   </p:timing>
@@ -6001,6 +6374,18 @@
   <p:clrMapOvr>
     <a:masterClrMapping/>
   </p:clrMapOvr>
+  <mc:AlternateContent xmlns:mc="http://schemas.openxmlformats.org/markup-compatibility/2006">
+    <mc:Choice xmlns:p14="http://schemas.microsoft.com/office/powerpoint/2010/main" Requires="p14">
+      <p:transition spd="med" p14:dur="700">
+        <p:fade/>
+      </p:transition>
+    </mc:Choice>
+    <mc:Fallback>
+      <p:transition spd="med">
+        <p:fade/>
+      </p:transition>
+    </mc:Fallback>
+  </mc:AlternateContent>
   <p:timing>
     <p:tnLst>
       <p:par>
@@ -6110,6 +6495,47 @@
           </a:p>
         </p:txBody>
       </p:sp>
+      <p:pic>
+        <p:nvPicPr>
+          <p:cNvPr id="2050" name="Picture 2" descr="https://tse1.mm.bing.net/th?&amp;id=HN.608021916090961249&amp;w=300&amp;h=300&amp;c=0&amp;pid=1.9&amp;rs=0&amp;p=0"/>
+          <p:cNvPicPr>
+            <a:picLocks noChangeAspect="1" noChangeArrowheads="1"/>
+          </p:cNvPicPr>
+          <p:nvPr/>
+        </p:nvPicPr>
+        <p:blipFill>
+          <a:blip r:embed="rId2">
+            <a:extLst>
+              <a:ext uri="{28A0092B-C50C-407E-A947-70E740481C1C}">
+                <a14:useLocalDpi xmlns:a14="http://schemas.microsoft.com/office/drawing/2010/main" val="0"/>
+              </a:ext>
+            </a:extLst>
+          </a:blip>
+          <a:srcRect/>
+          <a:stretch>
+            <a:fillRect/>
+          </a:stretch>
+        </p:blipFill>
+        <p:spPr bwMode="auto">
+          <a:xfrm>
+            <a:off x="1509362" y="2194560"/>
+            <a:ext cx="3312022" cy="3312022"/>
+          </a:xfrm>
+          <a:prstGeom prst="rect">
+            <a:avLst/>
+          </a:prstGeom>
+          <a:noFill/>
+          <a:extLst>
+            <a:ext uri="{909E8E84-426E-40DD-AFC4-6F175D3DCCD1}">
+              <a14:hiddenFill xmlns:a14="http://schemas.microsoft.com/office/drawing/2010/main">
+                <a:solidFill>
+                  <a:srgbClr val="FFFFFF"/>
+                </a:solidFill>
+              </a14:hiddenFill>
+            </a:ext>
+          </a:extLst>
+        </p:spPr>
+      </p:pic>
     </p:spTree>
     <p:extLst>
       <p:ext uri="{BB962C8B-B14F-4D97-AF65-F5344CB8AC3E}">
@@ -6120,10 +6546,98 @@
   <p:clrMapOvr>
     <a:masterClrMapping/>
   </p:clrMapOvr>
+  <mc:AlternateContent xmlns:mc="http://schemas.openxmlformats.org/markup-compatibility/2006">
+    <mc:Choice xmlns:p14="http://schemas.microsoft.com/office/powerpoint/2010/main" Requires="p14">
+      <p:transition spd="med" p14:dur="700">
+        <p:fade/>
+      </p:transition>
+    </mc:Choice>
+    <mc:Fallback>
+      <p:transition spd="med">
+        <p:fade/>
+      </p:transition>
+    </mc:Fallback>
+  </mc:AlternateContent>
   <p:timing>
     <p:tnLst>
       <p:par>
-        <p:cTn id="1" dur="indefinite" restart="never" nodeType="tmRoot"/>
+        <p:cTn id="1" dur="indefinite" restart="never" nodeType="tmRoot">
+          <p:childTnLst>
+            <p:seq concurrent="1" nextAc="seek">
+              <p:cTn id="2" dur="indefinite" nodeType="mainSeq">
+                <p:childTnLst>
+                  <p:par>
+                    <p:cTn id="3" fill="hold">
+                      <p:stCondLst>
+                        <p:cond delay="indefinite"/>
+                      </p:stCondLst>
+                      <p:childTnLst>
+                        <p:par>
+                          <p:cTn id="4" fill="hold">
+                            <p:stCondLst>
+                              <p:cond delay="0"/>
+                            </p:stCondLst>
+                            <p:childTnLst>
+                              <p:par>
+                                <p:cTn id="5" presetID="10" presetClass="entr" presetSubtype="0" fill="hold" nodeType="clickEffect">
+                                  <p:stCondLst>
+                                    <p:cond delay="500"/>
+                                  </p:stCondLst>
+                                  <p:childTnLst>
+                                    <p:set>
+                                      <p:cBhvr>
+                                        <p:cTn id="6" dur="1" fill="hold">
+                                          <p:stCondLst>
+                                            <p:cond delay="0"/>
+                                          </p:stCondLst>
+                                        </p:cTn>
+                                        <p:tgtEl>
+                                          <p:spTgt spid="2050"/>
+                                        </p:tgtEl>
+                                        <p:attrNameLst>
+                                          <p:attrName>style.visibility</p:attrName>
+                                        </p:attrNameLst>
+                                      </p:cBhvr>
+                                      <p:to>
+                                        <p:strVal val="visible"/>
+                                      </p:to>
+                                    </p:set>
+                                    <p:animEffect transition="in" filter="fade">
+                                      <p:cBhvr>
+                                        <p:cTn id="7" dur="1000"/>
+                                        <p:tgtEl>
+                                          <p:spTgt spid="2050"/>
+                                        </p:tgtEl>
+                                      </p:cBhvr>
+                                    </p:animEffect>
+                                  </p:childTnLst>
+                                </p:cTn>
+                              </p:par>
+                            </p:childTnLst>
+                          </p:cTn>
+                        </p:par>
+                      </p:childTnLst>
+                    </p:cTn>
+                  </p:par>
+                </p:childTnLst>
+              </p:cTn>
+              <p:prevCondLst>
+                <p:cond evt="onPrev" delay="0">
+                  <p:tgtEl>
+                    <p:sldTgt/>
+                  </p:tgtEl>
+                </p:cond>
+              </p:prevCondLst>
+              <p:nextCondLst>
+                <p:cond evt="onNext" delay="0">
+                  <p:tgtEl>
+                    <p:sldTgt/>
+                  </p:tgtEl>
+                </p:cond>
+              </p:nextCondLst>
+            </p:seq>
+          </p:childTnLst>
+        </p:cTn>
       </p:par>
     </p:tnLst>
   </p:timing>
@@ -6162,6 +6676,10 @@
           <a:bodyPr/>
           <a:lstStyle/>
           <a:p>
+            <a:r>
+              <a:rPr lang="en-US" dirty="0" smtClean="0"/>
+              <a:t>Investing in the idea</a:t>
+            </a:r>
             <a:endParaRPr lang="en-US" dirty="0"/>
           </a:p>
         </p:txBody>
@@ -6176,15 +6694,116 @@
             <p:ph idx="1"/>
           </p:nvPr>
         </p:nvSpPr>
-        <p:spPr/>
-        <p:txBody>
-          <a:bodyPr/>
-          <a:lstStyle/>
-          <a:p>
-            <a:endParaRPr lang="en-US" dirty="0"/>
-          </a:p>
-        </p:txBody>
-      </p:sp>
+        <p:spPr>
+          <a:xfrm>
+            <a:off x="685800" y="2194560"/>
+            <a:ext cx="10820400" cy="2820353"/>
+          </a:xfrm>
+        </p:spPr>
+        <p:txBody>
+          <a:bodyPr>
+            <a:normAutofit/>
+          </a:bodyPr>
+          <a:lstStyle/>
+          <a:p>
+            <a:pPr algn="r"/>
+            <a:r>
+              <a:rPr lang="en-US" sz="2800" dirty="0" smtClean="0"/>
+              <a:t>Replayability</a:t>
+            </a:r>
+          </a:p>
+          <a:p>
+            <a:pPr algn="r"/>
+            <a:endParaRPr lang="en-US" sz="2800" dirty="0"/>
+          </a:p>
+          <a:p>
+            <a:pPr algn="r"/>
+            <a:r>
+              <a:rPr lang="en-US" sz="2800" dirty="0" smtClean="0"/>
+              <a:t>Expandable</a:t>
+            </a:r>
+          </a:p>
+          <a:p>
+            <a:pPr algn="r"/>
+            <a:endParaRPr lang="en-US" sz="2800" dirty="0"/>
+          </a:p>
+          <a:p>
+            <a:pPr algn="r"/>
+            <a:r>
+              <a:rPr lang="en-US" sz="2800" dirty="0" smtClean="0"/>
+              <a:t>Planning tool</a:t>
+            </a:r>
+            <a:endParaRPr lang="en-US" sz="2800" dirty="0"/>
+          </a:p>
+        </p:txBody>
+      </p:sp>
+      <p:sp>
+        <p:nvSpPr>
+          <p:cNvPr id="4" name="TextBox 3"/>
+          <p:cNvSpPr txBox="1"/>
+          <p:nvPr/>
+        </p:nvSpPr>
+        <p:spPr>
+          <a:xfrm>
+            <a:off x="1019938" y="5214938"/>
+            <a:ext cx="10152138" cy="523220"/>
+          </a:xfrm>
+          <a:prstGeom prst="rect">
+            <a:avLst/>
+          </a:prstGeom>
+          <a:noFill/>
+        </p:spPr>
+        <p:txBody>
+          <a:bodyPr wrap="none" rtlCol="0">
+            <a:spAutoFit/>
+          </a:bodyPr>
+          <a:lstStyle/>
+          <a:p>
+            <a:pPr algn="ctr"/>
+            <a:r>
+              <a:rPr lang="en-US" sz="2800" i="1" dirty="0" smtClean="0">
+                <a:latin typeface="Batang" panose="02030600000101010101" pitchFamily="18" charset="-127"/>
+                <a:ea typeface="Batang" panose="02030600000101010101" pitchFamily="18" charset="-127"/>
+              </a:rPr>
+              <a:t>“Limitless potential, limitless possibility, limitless power.”</a:t>
+            </a:r>
+            <a:endParaRPr lang="en-US" sz="2800" i="1" dirty="0">
+              <a:latin typeface="Batang" panose="02030600000101010101" pitchFamily="18" charset="-127"/>
+              <a:ea typeface="Batang" panose="02030600000101010101" pitchFamily="18" charset="-127"/>
+            </a:endParaRPr>
+          </a:p>
+        </p:txBody>
+      </p:sp>
+      <p:pic>
+        <p:nvPicPr>
+          <p:cNvPr id="5" name="Picture 4"/>
+          <p:cNvPicPr>
+            <a:picLocks noChangeAspect="1"/>
+          </p:cNvPicPr>
+          <p:nvPr/>
+        </p:nvPicPr>
+        <p:blipFill>
+          <a:blip r:embed="rId2">
+            <a:extLst>
+              <a:ext uri="{28A0092B-C50C-407E-A947-70E740481C1C}">
+                <a14:useLocalDpi xmlns:a14="http://schemas.microsoft.com/office/drawing/2010/main" val="0"/>
+              </a:ext>
+            </a:extLst>
+          </a:blip>
+          <a:stretch>
+            <a:fillRect/>
+          </a:stretch>
+        </p:blipFill>
+        <p:spPr>
+          <a:xfrm>
+            <a:off x="1345298" y="2057401"/>
+            <a:ext cx="4933316" cy="2785872"/>
+          </a:xfrm>
+          <a:prstGeom prst="rect">
+            <a:avLst/>
+          </a:prstGeom>
+        </p:spPr>
+      </p:pic>
     </p:spTree>
     <p:extLst>
       <p:ext uri="{BB962C8B-B14F-4D97-AF65-F5344CB8AC3E}">
@@ -6195,6 +6814,18 @@
   <p:clrMapOvr>
     <a:masterClrMapping/>
   </p:clrMapOvr>
+  <mc:AlternateContent xmlns:mc="http://schemas.openxmlformats.org/markup-compatibility/2006">
+    <mc:Choice xmlns:p14="http://schemas.microsoft.com/office/powerpoint/2010/main" Requires="p14">
+      <p:transition spd="med" p14:dur="700">
+        <p:fade/>
+      </p:transition>
+    </mc:Choice>
+    <mc:Fallback>
+      <p:transition spd="med">
+        <p:fade/>
+      </p:transition>
+    </mc:Fallback>
+  </mc:AlternateContent>
   <p:timing>
     <p:tnLst>
       <p:par>
@@ -6266,6 +6897,18 @@
   <p:clrMapOvr>
     <a:masterClrMapping/>
   </p:clrMapOvr>
+  <mc:AlternateContent xmlns:mc="http://schemas.openxmlformats.org/markup-compatibility/2006">
+    <mc:Choice xmlns:p14="http://schemas.microsoft.com/office/powerpoint/2010/main" Requires="p14">
+      <p:transition spd="med" p14:dur="700">
+        <p:fade/>
+      </p:transition>
+    </mc:Choice>
+    <mc:Fallback>
+      <p:transition spd="med">
+        <p:fade/>
+      </p:transition>
+    </mc:Fallback>
+  </mc:AlternateContent>
   <p:timing>
     <p:tnLst>
       <p:par>

</xml_diff>